<commit_message>
added placeholder for exporting Compliance reports
</commit_message>
<xml_diff>
--- a/05-scheduling-scans-reports.pptx
+++ b/05-scheduling-scans-reports.pptx
@@ -295,7 +295,7 @@
               <a:pPr>
                 <a:defRPr/>
               </a:pPr>
-              <a:t>2015-12-30</a:t>
+              <a:t>2015-12-31</a:t>
             </a:fld>
             <a:endParaRPr lang="en-US" dirty="0"/>
           </a:p>
@@ -478,7 +478,7 @@
               <a:pPr>
                 <a:defRPr/>
               </a:pPr>
-              <a:t>2015-12-30</a:t>
+              <a:t>2015-12-31</a:t>
             </a:fld>
             <a:endParaRPr lang="en-US" dirty="0"/>
           </a:p>
@@ -1059,11 +1059,7 @@
           <a:p>
             <a:r>
               <a:rPr lang="en-US" dirty="0" smtClean="0"/>
-              <a:t>This time distinction </a:t>
-            </a:r>
-            <a:r>
-              <a:rPr lang="en-US" dirty="0" smtClean="0"/>
-              <a:t>is important</a:t>
+              <a:t>This time distinction is important</a:t>
             </a:r>
             <a:r>
               <a:rPr lang="en-US" baseline="0" dirty="0" smtClean="0"/>
@@ -1386,7 +1382,15 @@
             </a:r>
             <a:r>
               <a:rPr lang="en-US" baseline="0" dirty="0" smtClean="0"/>
-              <a:t> recommend you demonstrate the available recurrence values in the UI at this time. </a:t>
+              <a:t> recommend you show </a:t>
+            </a:r>
+            <a:r>
+              <a:rPr lang="en-US" baseline="0" smtClean="0"/>
+              <a:t>the class the </a:t>
+            </a:r>
+            <a:r>
+              <a:rPr lang="en-US" baseline="0" dirty="0" smtClean="0"/>
+              <a:t>available recurrence values in the UI at this time. </a:t>
             </a:r>
             <a:endParaRPr lang="en-US" dirty="0"/>
           </a:p>
@@ -12951,15 +12955,7 @@
           <a:p>
             <a:r>
               <a:rPr lang="en-US" dirty="0" smtClean="0"/>
-              <a:t>To do so, set up a scheduled scan </a:t>
-            </a:r>
-            <a:r>
-              <a:rPr lang="en-US" dirty="0" smtClean="0"/>
-              <a:t>like you </a:t>
-            </a:r>
-            <a:r>
-              <a:rPr lang="en-US" dirty="0" smtClean="0"/>
-              <a:t>just did... </a:t>
+              <a:t>To do so, set up a scheduled scan like you just did... </a:t>
             </a:r>
           </a:p>
           <a:p>
@@ -13103,15 +13099,7 @@
           <a:p>
             <a:r>
               <a:rPr lang="en-US" dirty="0" smtClean="0"/>
-              <a:t>...but when you get to the page with the </a:t>
-            </a:r>
-            <a:r>
-              <a:rPr lang="en-US" dirty="0" smtClean="0"/>
-              <a:t>calendar (Scan nodes page), </a:t>
-            </a:r>
-            <a:r>
-              <a:rPr lang="en-US" dirty="0" smtClean="0"/>
-              <a:t>click the </a:t>
+              <a:t>...but when you get to the page with the calendar (Scan nodes page), click the </a:t>
             </a:r>
             <a:r>
               <a:rPr lang="en-US" b="1" dirty="0" smtClean="0"/>
@@ -13283,15 +13271,7 @@
           <a:p>
             <a:r>
               <a:rPr lang="en-US" dirty="0" smtClean="0"/>
-              <a:t>The </a:t>
-            </a:r>
-            <a:r>
-              <a:rPr lang="en-US" dirty="0" smtClean="0"/>
-              <a:t>list of old scheduled jobs can grow so you should delete them </a:t>
-            </a:r>
-            <a:r>
-              <a:rPr lang="en-US" dirty="0" smtClean="0"/>
-              <a:t>if you no longer need them.</a:t>
+              <a:t>The list of old scheduled jobs can grow so you should delete them if you no longer need them.</a:t>
             </a:r>
             <a:endParaRPr lang="en-US" dirty="0"/>
           </a:p>
@@ -13401,7 +13381,6 @@
               <a:rPr lang="en-US" dirty="0" smtClean="0"/>
               <a:t> button.</a:t>
             </a:r>
-            <a:endParaRPr lang="en-US" dirty="0" smtClean="0"/>
           </a:p>
           <a:p>
             <a:endParaRPr lang="en-US" dirty="0"/>
@@ -14628,11 +14607,7 @@
             </a:r>
             <a:r>
               <a:rPr lang="en-US" dirty="0" smtClean="0"/>
-              <a:t>up-to-date </a:t>
-            </a:r>
-            <a:r>
-              <a:rPr lang="en-US" dirty="0" smtClean="0"/>
-              <a:t>compliance information </a:t>
+              <a:t>up-to-date compliance information </a:t>
             </a:r>
             <a:r>
               <a:rPr lang="en-US" dirty="0"/>
@@ -14745,19 +14720,7 @@
           <a:p>
             <a:r>
               <a:rPr lang="en-US" dirty="0" smtClean="0"/>
-              <a:t>The time zone for </a:t>
-            </a:r>
-            <a:r>
-              <a:rPr lang="en-US" dirty="0" smtClean="0"/>
-              <a:t>"Date" scheduling </a:t>
-            </a:r>
-            <a:r>
-              <a:rPr lang="en-US" dirty="0" smtClean="0"/>
-              <a:t>in the Compliance web UI is based on your local workstation's browser time zone</a:t>
-            </a:r>
-            <a:r>
-              <a:rPr lang="en-US" dirty="0" smtClean="0"/>
-              <a:t>.</a:t>
+              <a:t>The time zone for "Date" scheduling in the Compliance web UI is based on your local workstation's browser time zone.</a:t>
             </a:r>
           </a:p>
           <a:p>
@@ -14791,15 +14754,7 @@
           <a:p>
             <a:r>
               <a:rPr lang="en-US" dirty="0" smtClean="0"/>
-              <a:t>The Compliance </a:t>
-            </a:r>
-            <a:r>
-              <a:rPr lang="en-US" dirty="0" smtClean="0"/>
-              <a:t>logs, should you view them, are also based </a:t>
-            </a:r>
-            <a:r>
-              <a:rPr lang="en-US" dirty="0" smtClean="0"/>
-              <a:t>on UTC.</a:t>
+              <a:t>The Compliance logs, should you view them, are also based on UTC.</a:t>
             </a:r>
             <a:endParaRPr lang="en-US" dirty="0"/>
           </a:p>
@@ -15317,7 +15272,7 @@
           <a:p>
             <a:r>
               <a:rPr lang="en-US" dirty="0" smtClean="0"/>
-              <a:t>8. Click the up arrows and set the scheduled time to 5 minutes from now and then click </a:t>
+              <a:t>8. Click the up arrow and set the scheduled time to 5 minutes from now and then click </a:t>
             </a:r>
             <a:r>
               <a:rPr lang="en-US" b="1" dirty="0" smtClean="0"/>

</xml_diff>